<commit_message>
Small changes in text and bugfixes in Vorlage-pptx
</commit_message>
<xml_diff>
--- a/Praesentation/FMSynthese-Vorlage.pptx
+++ b/Praesentation/FMSynthese-Vorlage.pptx
@@ -8,7 +8,7 @@
     <p:notesMasterId r:id="rId3"/>
   </p:notesMasterIdLst>
   <p:sldIdLst>
-    <p:sldId id="256" r:id="rId2"/>
+    <p:sldId id="258" r:id="rId2"/>
   </p:sldIdLst>
   <p:sldSz cx="9144000" cy="5143500" type="screen16x9"/>
   <p:notesSz cx="6858000" cy="9144000"/>
@@ -193,7 +193,7 @@
             <a:fld id="{364A5697-ABCF-455C-8519-931EFDD64AAA}" type="datetimeFigureOut">
               <a:rPr lang="de-DE" smtClean="0"/>
               <a:pPr/>
-              <a:t>10.06.2015</a:t>
+              <a:t>11.06.2015</a:t>
             </a:fld>
             <a:endParaRPr lang="de-DE"/>
           </a:p>
@@ -641,7 +641,7 @@
             <a:fld id="{D1973D6C-51AD-4508-B508-FD358C94A360}" type="datetime1">
               <a:rPr lang="de-DE" smtClean="0"/>
               <a:pPr/>
-              <a:t>10.06.2015</a:t>
+              <a:t>11.06.2015</a:t>
             </a:fld>
             <a:endParaRPr lang="de-DE"/>
           </a:p>
@@ -812,7 +812,7 @@
             <a:fld id="{16CA1741-E8C7-4D32-930D-2CBEC658BBE9}" type="datetime1">
               <a:rPr lang="de-DE" smtClean="0"/>
               <a:pPr/>
-              <a:t>10.06.2015</a:t>
+              <a:t>11.06.2015</a:t>
             </a:fld>
             <a:endParaRPr lang="de-DE"/>
           </a:p>
@@ -993,7 +993,7 @@
             <a:fld id="{BA20089B-28E9-4E3D-8F82-6328AE8CACA6}" type="datetime1">
               <a:rPr lang="de-DE" smtClean="0"/>
               <a:pPr/>
-              <a:t>10.06.2015</a:t>
+              <a:t>11.06.2015</a:t>
             </a:fld>
             <a:endParaRPr lang="de-DE"/>
           </a:p>
@@ -1164,7 +1164,7 @@
             <a:fld id="{1C72BD4E-61B2-40A3-A75C-5FDEDE8E5EC5}" type="datetime1">
               <a:rPr lang="de-DE" smtClean="0"/>
               <a:pPr/>
-              <a:t>10.06.2015</a:t>
+              <a:t>11.06.2015</a:t>
             </a:fld>
             <a:endParaRPr lang="de-DE"/>
           </a:p>
@@ -1411,7 +1411,7 @@
             <a:fld id="{48E855D6-EEBE-45BF-8BB5-776601FA5085}" type="datetime1">
               <a:rPr lang="de-DE" smtClean="0"/>
               <a:pPr/>
-              <a:t>10.06.2015</a:t>
+              <a:t>11.06.2015</a:t>
             </a:fld>
             <a:endParaRPr lang="de-DE"/>
           </a:p>
@@ -1700,7 +1700,7 @@
             <a:fld id="{EF380378-A65B-4494-A5A7-886B50CB4937}" type="datetime1">
               <a:rPr lang="de-DE" smtClean="0"/>
               <a:pPr/>
-              <a:t>10.06.2015</a:t>
+              <a:t>11.06.2015</a:t>
             </a:fld>
             <a:endParaRPr lang="de-DE"/>
           </a:p>
@@ -2123,7 +2123,7 @@
             <a:fld id="{BF9B2ACF-C63C-45AF-B5D6-56753CCBEEC7}" type="datetime1">
               <a:rPr lang="de-DE" smtClean="0"/>
               <a:pPr/>
-              <a:t>10.06.2015</a:t>
+              <a:t>11.06.2015</a:t>
             </a:fld>
             <a:endParaRPr lang="de-DE"/>
           </a:p>
@@ -2242,7 +2242,7 @@
             <a:fld id="{782C60A8-75F3-45EE-8F68-824804B9A36B}" type="datetime1">
               <a:rPr lang="de-DE" smtClean="0"/>
               <a:pPr/>
-              <a:t>10.06.2015</a:t>
+              <a:t>11.06.2015</a:t>
             </a:fld>
             <a:endParaRPr lang="de-DE"/>
           </a:p>
@@ -2338,7 +2338,7 @@
             <a:fld id="{AC76AE4E-B847-44C0-9E80-FADAC514238D}" type="datetime1">
               <a:rPr lang="de-DE" smtClean="0"/>
               <a:pPr/>
-              <a:t>10.06.2015</a:t>
+              <a:t>11.06.2015</a:t>
             </a:fld>
             <a:endParaRPr lang="de-DE"/>
           </a:p>
@@ -2616,7 +2616,7 @@
             <a:fld id="{93EB1BC4-DA1F-4C44-8E36-1B9FD72AD58E}" type="datetime1">
               <a:rPr lang="de-DE" smtClean="0"/>
               <a:pPr/>
-              <a:t>10.06.2015</a:t>
+              <a:t>11.06.2015</a:t>
             </a:fld>
             <a:endParaRPr lang="de-DE"/>
           </a:p>
@@ -2870,7 +2870,7 @@
             <a:fld id="{E23DD280-69E3-4A3C-8762-77BE68C0FDBF}" type="datetime1">
               <a:rPr lang="de-DE" smtClean="0"/>
               <a:pPr/>
-              <a:t>10.06.2015</a:t>
+              <a:t>11.06.2015</a:t>
             </a:fld>
             <a:endParaRPr lang="de-DE"/>
           </a:p>
@@ -3084,7 +3084,7 @@
             <a:fld id="{A1830189-BAB1-4688-8766-4D2AC2DF7C33}" type="datetime1">
               <a:rPr lang="de-DE" smtClean="0"/>
               <a:pPr/>
-              <a:t>10.06.2015</a:t>
+              <a:t>11.06.2015</a:t>
             </a:fld>
             <a:endParaRPr lang="de-DE" dirty="0"/>
           </a:p>
@@ -3497,38 +3497,105 @@
             <a:spLocks noGrp="1"/>
           </p:cNvSpPr>
           <p:nvPr>
-            <p:ph type="ctrTitle"/>
-          </p:nvPr>
-        </p:nvSpPr>
-        <p:spPr/>
-        <p:txBody>
-          <a:bodyPr>
-            <a:normAutofit/>
-          </a:bodyPr>
-          <a:lstStyle/>
-          <a:p>
-            <a:endParaRPr lang="de-DE" sz="3600" dirty="0"/>
-          </a:p>
-        </p:txBody>
-      </p:sp>
-      <p:sp>
-        <p:nvSpPr>
-          <p:cNvPr id="3" name="Untertitel 2"/>
-          <p:cNvSpPr>
-            <a:spLocks noGrp="1"/>
-          </p:cNvSpPr>
-          <p:nvPr>
-            <p:ph type="subTitle" idx="1"/>
-          </p:nvPr>
-        </p:nvSpPr>
-        <p:spPr/>
-        <p:txBody>
-          <a:bodyPr>
-            <a:normAutofit/>
-          </a:bodyPr>
-          <a:lstStyle/>
-          <a:p>
-            <a:endParaRPr lang="de-DE" sz="2800" dirty="0"/>
+            <p:ph type="title"/>
+          </p:nvPr>
+        </p:nvSpPr>
+        <p:spPr/>
+        <p:txBody>
+          <a:bodyPr/>
+          <a:lstStyle/>
+          <a:p>
+            <a:endParaRPr lang="de-DE"/>
+          </a:p>
+        </p:txBody>
+      </p:sp>
+      <p:sp>
+        <p:nvSpPr>
+          <p:cNvPr id="3" name="Inhaltsplatzhalter 2"/>
+          <p:cNvSpPr>
+            <a:spLocks noGrp="1"/>
+          </p:cNvSpPr>
+          <p:nvPr>
+            <p:ph idx="1"/>
+          </p:nvPr>
+        </p:nvSpPr>
+        <p:spPr/>
+        <p:txBody>
+          <a:bodyPr/>
+          <a:lstStyle/>
+          <a:p>
+            <a:endParaRPr lang="de-DE"/>
+          </a:p>
+        </p:txBody>
+      </p:sp>
+      <p:sp>
+        <p:nvSpPr>
+          <p:cNvPr id="4" name="Datumsplatzhalter 3"/>
+          <p:cNvSpPr>
+            <a:spLocks noGrp="1"/>
+          </p:cNvSpPr>
+          <p:nvPr>
+            <p:ph type="dt" sz="half" idx="10"/>
+          </p:nvPr>
+        </p:nvSpPr>
+        <p:spPr/>
+        <p:txBody>
+          <a:bodyPr/>
+          <a:lstStyle/>
+          <a:p>
+            <a:fld id="{1C72BD4E-61B2-40A3-A75C-5FDEDE8E5EC5}" type="datetime1">
+              <a:rPr lang="de-DE" smtClean="0"/>
+              <a:pPr/>
+              <a:t>11.06.2015</a:t>
+            </a:fld>
+            <a:endParaRPr lang="de-DE"/>
+          </a:p>
+        </p:txBody>
+      </p:sp>
+      <p:sp>
+        <p:nvSpPr>
+          <p:cNvPr id="5" name="Fußzeilenplatzhalter 4"/>
+          <p:cNvSpPr>
+            <a:spLocks noGrp="1"/>
+          </p:cNvSpPr>
+          <p:nvPr>
+            <p:ph type="ftr" sz="quarter" idx="11"/>
+          </p:nvPr>
+        </p:nvSpPr>
+        <p:spPr/>
+        <p:txBody>
+          <a:bodyPr/>
+          <a:lstStyle/>
+          <a:p>
+            <a:r>
+              <a:rPr lang="de-DE" smtClean="0"/>
+              <a:t>FM-Synthese</a:t>
+            </a:r>
+            <a:endParaRPr lang="de-DE"/>
+          </a:p>
+        </p:txBody>
+      </p:sp>
+      <p:sp>
+        <p:nvSpPr>
+          <p:cNvPr id="6" name="Foliennummernplatzhalter 5"/>
+          <p:cNvSpPr>
+            <a:spLocks noGrp="1"/>
+          </p:cNvSpPr>
+          <p:nvPr>
+            <p:ph type="sldNum" sz="quarter" idx="12"/>
+          </p:nvPr>
+        </p:nvSpPr>
+        <p:spPr/>
+        <p:txBody>
+          <a:bodyPr/>
+          <a:lstStyle/>
+          <a:p>
+            <a:fld id="{6C6AE60A-B69C-4790-82F7-3882EDF23186}" type="slidenum">
+              <a:rPr lang="de-DE" smtClean="0"/>
+              <a:pPr/>
+              <a:t>1</a:t>
+            </a:fld>
+            <a:endParaRPr lang="de-DE" dirty="0"/>
           </a:p>
         </p:txBody>
       </p:sp>

</xml_diff>